<commit_message>
Update presentation add level4 for raphael
</commit_message>
<xml_diff>
--- a/Presentation_3DGB_RedRunner.pptx
+++ b/Presentation_3DGB_RedRunner.pptx
@@ -272,7 +272,7 @@
           <a:p>
             <a:fld id="{F392CBB9-624E-484A-8375-99B101E99E04}" type="datetimeFigureOut">
               <a:rPr lang="en-GB" smtClean="0"/>
-              <a:t>09/10/2019</a:t>
+              <a:t>14/10/2019</a:t>
             </a:fld>
             <a:endParaRPr lang="en-GB"/>
           </a:p>
@@ -472,7 +472,7 @@
           <a:p>
             <a:fld id="{F392CBB9-624E-484A-8375-99B101E99E04}" type="datetimeFigureOut">
               <a:rPr lang="en-GB" smtClean="0"/>
-              <a:t>09/10/2019</a:t>
+              <a:t>14/10/2019</a:t>
             </a:fld>
             <a:endParaRPr lang="en-GB"/>
           </a:p>
@@ -682,7 +682,7 @@
           <a:p>
             <a:fld id="{F392CBB9-624E-484A-8375-99B101E99E04}" type="datetimeFigureOut">
               <a:rPr lang="en-GB" smtClean="0"/>
-              <a:t>09/10/2019</a:t>
+              <a:t>14/10/2019</a:t>
             </a:fld>
             <a:endParaRPr lang="en-GB"/>
           </a:p>
@@ -882,7 +882,7 @@
           <a:p>
             <a:fld id="{F392CBB9-624E-484A-8375-99B101E99E04}" type="datetimeFigureOut">
               <a:rPr lang="en-GB" smtClean="0"/>
-              <a:t>09/10/2019</a:t>
+              <a:t>14/10/2019</a:t>
             </a:fld>
             <a:endParaRPr lang="en-GB"/>
           </a:p>
@@ -1158,7 +1158,7 @@
           <a:p>
             <a:fld id="{F392CBB9-624E-484A-8375-99B101E99E04}" type="datetimeFigureOut">
               <a:rPr lang="en-GB" smtClean="0"/>
-              <a:t>09/10/2019</a:t>
+              <a:t>14/10/2019</a:t>
             </a:fld>
             <a:endParaRPr lang="en-GB"/>
           </a:p>
@@ -1426,7 +1426,7 @@
           <a:p>
             <a:fld id="{F392CBB9-624E-484A-8375-99B101E99E04}" type="datetimeFigureOut">
               <a:rPr lang="en-GB" smtClean="0"/>
-              <a:t>09/10/2019</a:t>
+              <a:t>14/10/2019</a:t>
             </a:fld>
             <a:endParaRPr lang="en-GB"/>
           </a:p>
@@ -1841,7 +1841,7 @@
           <a:p>
             <a:fld id="{F392CBB9-624E-484A-8375-99B101E99E04}" type="datetimeFigureOut">
               <a:rPr lang="en-GB" smtClean="0"/>
-              <a:t>09/10/2019</a:t>
+              <a:t>14/10/2019</a:t>
             </a:fld>
             <a:endParaRPr lang="en-GB"/>
           </a:p>
@@ -1983,7 +1983,7 @@
           <a:p>
             <a:fld id="{F392CBB9-624E-484A-8375-99B101E99E04}" type="datetimeFigureOut">
               <a:rPr lang="en-GB" smtClean="0"/>
-              <a:t>09/10/2019</a:t>
+              <a:t>14/10/2019</a:t>
             </a:fld>
             <a:endParaRPr lang="en-GB"/>
           </a:p>
@@ -2096,7 +2096,7 @@
           <a:p>
             <a:fld id="{F392CBB9-624E-484A-8375-99B101E99E04}" type="datetimeFigureOut">
               <a:rPr lang="en-GB" smtClean="0"/>
-              <a:t>09/10/2019</a:t>
+              <a:t>14/10/2019</a:t>
             </a:fld>
             <a:endParaRPr lang="en-GB"/>
           </a:p>
@@ -2409,7 +2409,7 @@
           <a:p>
             <a:fld id="{F392CBB9-624E-484A-8375-99B101E99E04}" type="datetimeFigureOut">
               <a:rPr lang="en-GB" smtClean="0"/>
-              <a:t>09/10/2019</a:t>
+              <a:t>14/10/2019</a:t>
             </a:fld>
             <a:endParaRPr lang="en-GB"/>
           </a:p>
@@ -2698,7 +2698,7 @@
           <a:p>
             <a:fld id="{F392CBB9-624E-484A-8375-99B101E99E04}" type="datetimeFigureOut">
               <a:rPr lang="en-GB" smtClean="0"/>
-              <a:t>09/10/2019</a:t>
+              <a:t>14/10/2019</a:t>
             </a:fld>
             <a:endParaRPr lang="en-GB"/>
           </a:p>
@@ -2941,7 +2941,7 @@
           <a:p>
             <a:fld id="{F392CBB9-624E-484A-8375-99B101E99E04}" type="datetimeFigureOut">
               <a:rPr lang="en-GB" smtClean="0"/>
-              <a:t>09/10/2019</a:t>
+              <a:t>14/10/2019</a:t>
             </a:fld>
             <a:endParaRPr lang="en-GB"/>
           </a:p>
@@ -3708,6 +3708,47 @@
                 <a:latin typeface="True 2D" pitchFamily="2" charset="0"/>
               </a:rPr>
               <a:t>Game Over</a:t>
+            </a:r>
+          </a:p>
+        </p:txBody>
+      </p:sp>
+      <p:sp>
+        <p:nvSpPr>
+          <p:cNvPr id="6" name="TextBox 5">
+            <a:extLst>
+              <a:ext uri="{FF2B5EF4-FFF2-40B4-BE49-F238E27FC236}">
+                <a16:creationId xmlns:a16="http://schemas.microsoft.com/office/drawing/2014/main" id="{C9270DC2-3D6C-45D8-9928-A4AC32369D56}"/>
+              </a:ext>
+            </a:extLst>
+          </p:cNvPr>
+          <p:cNvSpPr txBox="1"/>
+          <p:nvPr/>
+        </p:nvSpPr>
+        <p:spPr>
+          <a:xfrm>
+            <a:off x="2023575" y="3828163"/>
+            <a:ext cx="5221388" cy="923330"/>
+          </a:xfrm>
+          <a:prstGeom prst="rect">
+            <a:avLst/>
+          </a:prstGeom>
+          <a:noFill/>
+        </p:spPr>
+        <p:txBody>
+          <a:bodyPr wrap="square" rtlCol="0">
+            <a:spAutoFit/>
+          </a:bodyPr>
+          <a:lstStyle/>
+          <a:p>
+            <a:pPr algn="ctr"/>
+            <a:r>
+              <a:rPr lang="fr-FR" sz="5400" b="1" dirty="0">
+                <a:solidFill>
+                  <a:srgbClr val="C00000"/>
+                </a:solidFill>
+                <a:latin typeface="True 2D" pitchFamily="2" charset="0"/>
+              </a:rPr>
+              <a:t>Level4</a:t>
             </a:r>
           </a:p>
         </p:txBody>
@@ -6816,18 +6857,18 @@
 </file>
 
 <file path=customXml/item2.xml><?xml version="1.0" encoding="utf-8"?>
-<p:properties xmlns:p="http://schemas.microsoft.com/office/2006/metadata/properties" xmlns:xsi="http://www.w3.org/2001/XMLSchema-instance" xmlns:pc="http://schemas.microsoft.com/office/infopath/2007/PartnerControls">
-  <documentManagement/>
-</p:properties>
-</file>
-
-<file path=customXml/item3.xml><?xml version="1.0" encoding="utf-8"?>
 <?mso-contentType ?>
 <FormTemplates xmlns="http://schemas.microsoft.com/sharepoint/v3/contenttype/forms">
   <Display>DocumentLibraryForm</Display>
   <Edit>DocumentLibraryForm</Edit>
   <New>DocumentLibraryForm</New>
 </FormTemplates>
+</file>
+
+<file path=customXml/item3.xml><?xml version="1.0" encoding="utf-8"?>
+<p:properties xmlns:p="http://schemas.microsoft.com/office/2006/metadata/properties" xmlns:xsi="http://www.w3.org/2001/XMLSchema-instance" xmlns:pc="http://schemas.microsoft.com/office/infopath/2007/PartnerControls">
+  <documentManagement/>
+</p:properties>
 </file>
 
 <file path=customXml/itemProps1.xml><?xml version="1.0" encoding="utf-8"?>
@@ -6849,6 +6890,14 @@
 </file>
 
 <file path=customXml/itemProps2.xml><?xml version="1.0" encoding="utf-8"?>
+<ds:datastoreItem xmlns:ds="http://schemas.openxmlformats.org/officeDocument/2006/customXml" ds:itemID="{BCBEF740-B9F0-4C38-B250-25FD374C9798}">
+  <ds:schemaRefs>
+    <ds:schemaRef ds:uri="http://schemas.microsoft.com/sharepoint/v3/contenttype/forms"/>
+  </ds:schemaRefs>
+</ds:datastoreItem>
+</file>
+
+<file path=customXml/itemProps3.xml><?xml version="1.0" encoding="utf-8"?>
 <ds:datastoreItem xmlns:ds="http://schemas.openxmlformats.org/officeDocument/2006/customXml" ds:itemID="{043C489F-95F2-4A20-992E-5C8343950EEA}">
   <ds:schemaRefs>
     <ds:schemaRef ds:uri="http://purl.org/dc/dcmitype/"/>
@@ -6862,12 +6911,4 @@
     <ds:schemaRef ds:uri="http://www.w3.org/XML/1998/namespace"/>
   </ds:schemaRefs>
 </ds:datastoreItem>
-</file>
-
-<file path=customXml/itemProps3.xml><?xml version="1.0" encoding="utf-8"?>
-<ds:datastoreItem xmlns:ds="http://schemas.openxmlformats.org/officeDocument/2006/customXml" ds:itemID="{BCBEF740-B9F0-4C38-B250-25FD374C9798}">
-  <ds:schemaRefs>
-    <ds:schemaRef ds:uri="http://schemas.microsoft.com/sharepoint/v3/contenttype/forms"/>
-  </ds:schemaRefs>
-</ds:datastoreItem>
 </file>
</xml_diff>